<commit_message>
final presentation push for real!!!!
</commit_message>
<xml_diff>
--- a/Unsupervised_Data_Quality_Monitoring.pptx
+++ b/Unsupervised_Data_Quality_Monitoring.pptx
@@ -817,7 +817,7 @@
   <p:cSld>
     <p:spTree>
       <p:nvGrpSpPr>
-        <p:cNvPr id="154" name="Shape 154"/>
+        <p:cNvPr id="153" name="Shape 153"/>
         <p:cNvGrpSpPr/>
         <p:nvPr/>
       </p:nvGrpSpPr>
@@ -831,7 +831,7 @@
       </p:grpSpPr>
       <p:sp>
         <p:nvSpPr>
-          <p:cNvPr id="155" name="Google Shape;155;g6c3d647655_1_1020:notes"/>
+          <p:cNvPr id="154" name="Google Shape;154;g6c3d647655_1_1020:notes"/>
           <p:cNvSpPr/>
           <p:nvPr>
             <p:ph idx="2" type="sldImg"/>
@@ -866,7 +866,7 @@
       </p:sp>
       <p:sp>
         <p:nvSpPr>
-          <p:cNvPr id="156" name="Google Shape;156;g6c3d647655_1_1020:notes"/>
+          <p:cNvPr id="155" name="Google Shape;155;g6c3d647655_1_1020:notes"/>
           <p:cNvSpPr txBox="1"/>
           <p:nvPr>
             <p:ph idx="1" type="body"/>
@@ -917,7 +917,7 @@
   <p:cSld>
     <p:spTree>
       <p:nvGrpSpPr>
-        <p:cNvPr id="164" name="Shape 164"/>
+        <p:cNvPr id="163" name="Shape 163"/>
         <p:cNvGrpSpPr/>
         <p:nvPr/>
       </p:nvGrpSpPr>
@@ -931,7 +931,7 @@
       </p:grpSpPr>
       <p:sp>
         <p:nvSpPr>
-          <p:cNvPr id="165" name="Google Shape;165;g6c3d647655_1_1025:notes"/>
+          <p:cNvPr id="164" name="Google Shape;164;g6c3d647655_1_1025:notes"/>
           <p:cNvSpPr/>
           <p:nvPr>
             <p:ph idx="2" type="sldImg"/>
@@ -966,7 +966,7 @@
       </p:sp>
       <p:sp>
         <p:nvSpPr>
-          <p:cNvPr id="166" name="Google Shape;166;g6c3d647655_1_1025:notes"/>
+          <p:cNvPr id="165" name="Google Shape;165;g6c3d647655_1_1025:notes"/>
           <p:cNvSpPr txBox="1"/>
           <p:nvPr>
             <p:ph idx="1" type="body"/>
@@ -1217,7 +1217,7 @@
   <p:cSld>
     <p:spTree>
       <p:nvGrpSpPr>
-        <p:cNvPr id="101" name="Shape 101"/>
+        <p:cNvPr id="100" name="Shape 100"/>
         <p:cNvGrpSpPr/>
         <p:nvPr/>
       </p:nvGrpSpPr>
@@ -1231,7 +1231,7 @@
       </p:grpSpPr>
       <p:sp>
         <p:nvSpPr>
-          <p:cNvPr id="102" name="Google Shape;102;g6c3d647655_1_990:notes"/>
+          <p:cNvPr id="101" name="Google Shape;101;g6c3d647655_1_990:notes"/>
           <p:cNvSpPr/>
           <p:nvPr>
             <p:ph idx="2" type="sldImg"/>
@@ -1266,7 +1266,7 @@
       </p:sp>
       <p:sp>
         <p:nvSpPr>
-          <p:cNvPr id="103" name="Google Shape;103;g6c3d647655_1_990:notes"/>
+          <p:cNvPr id="102" name="Google Shape;102;g6c3d647655_1_990:notes"/>
           <p:cNvSpPr txBox="1"/>
           <p:nvPr>
             <p:ph idx="1" type="body"/>
@@ -1317,7 +1317,7 @@
   <p:cSld>
     <p:spTree>
       <p:nvGrpSpPr>
-        <p:cNvPr id="114" name="Shape 114"/>
+        <p:cNvPr id="113" name="Shape 113"/>
         <p:cNvGrpSpPr/>
         <p:nvPr/>
       </p:nvGrpSpPr>
@@ -1331,7 +1331,7 @@
       </p:grpSpPr>
       <p:sp>
         <p:nvSpPr>
-          <p:cNvPr id="115" name="Google Shape;115;g6c3d647655_1_1030:notes"/>
+          <p:cNvPr id="114" name="Google Shape;114;g6c3d647655_1_1030:notes"/>
           <p:cNvSpPr/>
           <p:nvPr>
             <p:ph idx="2" type="sldImg"/>
@@ -1366,7 +1366,7 @@
       </p:sp>
       <p:sp>
         <p:nvSpPr>
-          <p:cNvPr id="116" name="Google Shape;116;g6c3d647655_1_1030:notes"/>
+          <p:cNvPr id="115" name="Google Shape;115;g6c3d647655_1_1030:notes"/>
           <p:cNvSpPr txBox="1"/>
           <p:nvPr>
             <p:ph idx="1" type="body"/>
@@ -1417,7 +1417,7 @@
   <p:cSld>
     <p:spTree>
       <p:nvGrpSpPr>
-        <p:cNvPr id="120" name="Shape 120"/>
+        <p:cNvPr id="119" name="Shape 119"/>
         <p:cNvGrpSpPr/>
         <p:nvPr/>
       </p:nvGrpSpPr>
@@ -1431,7 +1431,7 @@
       </p:grpSpPr>
       <p:sp>
         <p:nvSpPr>
-          <p:cNvPr id="121" name="Google Shape;121;g6c3d647655_1_1005:notes"/>
+          <p:cNvPr id="120" name="Google Shape;120;g6c3d647655_1_1005:notes"/>
           <p:cNvSpPr/>
           <p:nvPr>
             <p:ph idx="2" type="sldImg"/>
@@ -1466,7 +1466,7 @@
       </p:sp>
       <p:sp>
         <p:nvSpPr>
-          <p:cNvPr id="122" name="Google Shape;122;g6c3d647655_1_1005:notes"/>
+          <p:cNvPr id="121" name="Google Shape;121;g6c3d647655_1_1005:notes"/>
           <p:cNvSpPr txBox="1"/>
           <p:nvPr>
             <p:ph idx="1" type="body"/>
@@ -1517,7 +1517,7 @@
   <p:cSld>
     <p:spTree>
       <p:nvGrpSpPr>
-        <p:cNvPr id="127" name="Shape 127"/>
+        <p:cNvPr id="126" name="Shape 126"/>
         <p:cNvGrpSpPr/>
         <p:nvPr/>
       </p:nvGrpSpPr>
@@ -1531,7 +1531,7 @@
       </p:grpSpPr>
       <p:sp>
         <p:nvSpPr>
-          <p:cNvPr id="128" name="Google Shape;128;g6c3d647655_1_1000:notes"/>
+          <p:cNvPr id="127" name="Google Shape;127;g6c3d647655_1_1000:notes"/>
           <p:cNvSpPr/>
           <p:nvPr>
             <p:ph idx="2" type="sldImg"/>
@@ -1566,7 +1566,7 @@
       </p:sp>
       <p:sp>
         <p:nvSpPr>
-          <p:cNvPr id="129" name="Google Shape;129;g6c3d647655_1_1000:notes"/>
+          <p:cNvPr id="128" name="Google Shape;128;g6c3d647655_1_1000:notes"/>
           <p:cNvSpPr txBox="1"/>
           <p:nvPr>
             <p:ph idx="1" type="body"/>
@@ -1633,7 +1633,7 @@
   <p:cSld>
     <p:spTree>
       <p:nvGrpSpPr>
-        <p:cNvPr id="139" name="Shape 139"/>
+        <p:cNvPr id="138" name="Shape 138"/>
         <p:cNvGrpSpPr/>
         <p:nvPr/>
       </p:nvGrpSpPr>
@@ -1647,7 +1647,7 @@
       </p:grpSpPr>
       <p:sp>
         <p:nvSpPr>
-          <p:cNvPr id="140" name="Google Shape;140;g6c3d647655_2_9:notes"/>
+          <p:cNvPr id="139" name="Google Shape;139;g6c3d647655_2_9:notes"/>
           <p:cNvSpPr/>
           <p:nvPr>
             <p:ph idx="2" type="sldImg"/>
@@ -1682,7 +1682,7 @@
       </p:sp>
       <p:sp>
         <p:nvSpPr>
-          <p:cNvPr id="141" name="Google Shape;141;g6c3d647655_2_9:notes"/>
+          <p:cNvPr id="140" name="Google Shape;140;g6c3d647655_2_9:notes"/>
           <p:cNvSpPr txBox="1"/>
           <p:nvPr>
             <p:ph idx="1" type="body"/>
@@ -1733,7 +1733,7 @@
   <p:cSld>
     <p:spTree>
       <p:nvGrpSpPr>
-        <p:cNvPr id="147" name="Shape 147"/>
+        <p:cNvPr id="146" name="Shape 146"/>
         <p:cNvGrpSpPr/>
         <p:nvPr/>
       </p:nvGrpSpPr>
@@ -1747,7 +1747,7 @@
       </p:grpSpPr>
       <p:sp>
         <p:nvSpPr>
-          <p:cNvPr id="148" name="Google Shape;148;g6c3d647655_1_1010:notes"/>
+          <p:cNvPr id="147" name="Google Shape;147;g6c3d647655_1_1010:notes"/>
           <p:cNvSpPr/>
           <p:nvPr>
             <p:ph idx="2" type="sldImg"/>
@@ -1782,7 +1782,7 @@
       </p:sp>
       <p:sp>
         <p:nvSpPr>
-          <p:cNvPr id="149" name="Google Shape;149;g6c3d647655_1_1010:notes"/>
+          <p:cNvPr id="148" name="Google Shape;148;g6c3d647655_1_1010:notes"/>
           <p:cNvSpPr txBox="1"/>
           <p:nvPr>
             <p:ph idx="1" type="body"/>
@@ -8622,7 +8622,7 @@
   <p:cSld>
     <p:spTree>
       <p:nvGrpSpPr>
-        <p:cNvPr id="157" name="Shape 157"/>
+        <p:cNvPr id="156" name="Shape 156"/>
         <p:cNvGrpSpPr/>
         <p:nvPr/>
       </p:nvGrpSpPr>
@@ -8636,7 +8636,7 @@
       </p:grpSpPr>
       <p:sp>
         <p:nvSpPr>
-          <p:cNvPr id="158" name="Google Shape;158;p22"/>
+          <p:cNvPr id="157" name="Google Shape;157;p22"/>
           <p:cNvSpPr txBox="1"/>
           <p:nvPr>
             <p:ph type="title"/>
@@ -8676,7 +8676,7 @@
       </p:sp>
       <p:sp>
         <p:nvSpPr>
-          <p:cNvPr id="159" name="Google Shape;159;p22"/>
+          <p:cNvPr id="158" name="Google Shape;158;p22"/>
           <p:cNvSpPr txBox="1"/>
           <p:nvPr>
             <p:ph idx="1" type="body"/>
@@ -8716,7 +8716,7 @@
       </p:sp>
       <p:pic>
         <p:nvPicPr>
-          <p:cNvPr id="160" name="Google Shape;160;p22"/>
+          <p:cNvPr id="159" name="Google Shape;159;p22"/>
           <p:cNvPicPr preferRelativeResize="0"/>
           <p:nvPr/>
         </p:nvPicPr>
@@ -8744,7 +8744,7 @@
       </p:pic>
       <p:pic>
         <p:nvPicPr>
-          <p:cNvPr id="161" name="Google Shape;161;p22"/>
+          <p:cNvPr id="160" name="Google Shape;160;p22"/>
           <p:cNvPicPr preferRelativeResize="0"/>
           <p:nvPr/>
         </p:nvPicPr>
@@ -8772,7 +8772,7 @@
       </p:pic>
       <p:pic>
         <p:nvPicPr>
-          <p:cNvPr id="162" name="Google Shape;162;p22"/>
+          <p:cNvPr id="161" name="Google Shape;161;p22"/>
           <p:cNvPicPr preferRelativeResize="0"/>
           <p:nvPr/>
         </p:nvPicPr>
@@ -8800,7 +8800,7 @@
       </p:pic>
       <p:sp>
         <p:nvSpPr>
-          <p:cNvPr id="163" name="Google Shape;163;p22"/>
+          <p:cNvPr id="162" name="Google Shape;162;p22"/>
           <p:cNvSpPr txBox="1"/>
           <p:nvPr>
             <p:ph idx="1" type="body"/>
@@ -8851,7 +8851,7 @@
   <p:cSld>
     <p:spTree>
       <p:nvGrpSpPr>
-        <p:cNvPr id="167" name="Shape 167"/>
+        <p:cNvPr id="166" name="Shape 166"/>
         <p:cNvGrpSpPr/>
         <p:nvPr/>
       </p:nvGrpSpPr>
@@ -8865,7 +8865,7 @@
       </p:grpSpPr>
       <p:sp>
         <p:nvSpPr>
-          <p:cNvPr id="168" name="Google Shape;168;p23"/>
+          <p:cNvPr id="167" name="Google Shape;167;p23"/>
           <p:cNvSpPr txBox="1"/>
           <p:nvPr>
             <p:ph type="title"/>
@@ -8905,7 +8905,7 @@
       </p:sp>
       <p:sp>
         <p:nvSpPr>
-          <p:cNvPr id="169" name="Google Shape;169;p23"/>
+          <p:cNvPr id="168" name="Google Shape;168;p23"/>
           <p:cNvSpPr txBox="1"/>
           <p:nvPr>
             <p:ph idx="1" type="body"/>
@@ -10103,58 +10103,6 @@
           </a:p>
         </p:txBody>
       </p:sp>
-      <p:sp>
-        <p:nvSpPr>
-          <p:cNvPr id="100" name="Google Shape;100;p15"/>
-          <p:cNvSpPr txBox="1"/>
-          <p:nvPr/>
-        </p:nvSpPr>
-        <p:spPr>
-          <a:xfrm>
-            <a:off x="509500" y="3651400"/>
-            <a:ext cx="4124400" cy="776400"/>
-          </a:xfrm>
-          <a:prstGeom prst="rect">
-            <a:avLst/>
-          </a:prstGeom>
-          <a:noFill/>
-          <a:ln>
-            <a:noFill/>
-          </a:ln>
-        </p:spPr>
-        <p:txBody>
-          <a:bodyPr anchorCtr="0" anchor="t" bIns="91425" lIns="91425" spcFirstLastPara="1" rIns="91425" wrap="square" tIns="91425">
-            <a:noAutofit/>
-          </a:bodyPr>
-          <a:lstStyle/>
-          <a:p>
-            <a:pPr indent="0" lvl="0" marL="0" rtl="0" algn="l">
-              <a:spcBef>
-                <a:spcPts val="0"/>
-              </a:spcBef>
-              <a:spcAft>
-                <a:spcPts val="0"/>
-              </a:spcAft>
-              <a:buNone/>
-            </a:pPr>
-            <a:r>
-              <a:rPr lang="en">
-                <a:latin typeface="Roboto"/>
-                <a:ea typeface="Roboto"/>
-                <a:cs typeface="Roboto"/>
-                <a:sym typeface="Roboto"/>
-              </a:rPr>
-              <a:t>Add NA stuff</a:t>
-            </a:r>
-            <a:endParaRPr>
-              <a:latin typeface="Roboto"/>
-              <a:ea typeface="Roboto"/>
-              <a:cs typeface="Roboto"/>
-              <a:sym typeface="Roboto"/>
-            </a:endParaRPr>
-          </a:p>
-        </p:txBody>
-      </p:sp>
     </p:spTree>
   </p:cSld>
   <p:clrMapOvr>
@@ -10168,7 +10116,7 @@
   <p:cSld>
     <p:spTree>
       <p:nvGrpSpPr>
-        <p:cNvPr id="104" name="Shape 104"/>
+        <p:cNvPr id="103" name="Shape 103"/>
         <p:cNvGrpSpPr/>
         <p:nvPr/>
       </p:nvGrpSpPr>
@@ -10182,7 +10130,7 @@
       </p:grpSpPr>
       <p:sp>
         <p:nvSpPr>
-          <p:cNvPr id="105" name="Google Shape;105;p16"/>
+          <p:cNvPr id="104" name="Google Shape;104;p16"/>
           <p:cNvSpPr txBox="1"/>
           <p:nvPr>
             <p:ph type="title"/>
@@ -10222,7 +10170,7 @@
       </p:sp>
       <p:sp>
         <p:nvSpPr>
-          <p:cNvPr id="106" name="Google Shape;106;p16"/>
+          <p:cNvPr id="105" name="Google Shape;105;p16"/>
           <p:cNvSpPr txBox="1"/>
           <p:nvPr>
             <p:ph idx="1" type="body"/>
@@ -10262,7 +10210,7 @@
       </p:sp>
       <p:pic>
         <p:nvPicPr>
-          <p:cNvPr id="107" name="Google Shape;107;p16"/>
+          <p:cNvPr id="106" name="Google Shape;106;p16"/>
           <p:cNvPicPr preferRelativeResize="0"/>
           <p:nvPr/>
         </p:nvPicPr>
@@ -10290,7 +10238,7 @@
       </p:pic>
       <p:pic>
         <p:nvPicPr>
-          <p:cNvPr id="108" name="Google Shape;108;p16"/>
+          <p:cNvPr id="107" name="Google Shape;107;p16"/>
           <p:cNvPicPr preferRelativeResize="0"/>
           <p:nvPr/>
         </p:nvPicPr>
@@ -10318,7 +10266,7 @@
       </p:pic>
       <p:sp>
         <p:nvSpPr>
-          <p:cNvPr id="109" name="Google Shape;109;p16"/>
+          <p:cNvPr id="108" name="Google Shape;108;p16"/>
           <p:cNvSpPr txBox="1"/>
           <p:nvPr/>
         </p:nvSpPr>
@@ -10376,7 +10324,7 @@
       </p:sp>
       <p:sp>
         <p:nvSpPr>
-          <p:cNvPr id="110" name="Google Shape;110;p16"/>
+          <p:cNvPr id="109" name="Google Shape;109;p16"/>
           <p:cNvSpPr txBox="1"/>
           <p:nvPr/>
         </p:nvSpPr>
@@ -10434,7 +10382,7 @@
       </p:sp>
       <p:cxnSp>
         <p:nvCxnSpPr>
-          <p:cNvPr id="111" name="Google Shape;111;p16"/>
+          <p:cNvPr id="110" name="Google Shape;110;p16"/>
           <p:cNvCxnSpPr/>
           <p:nvPr/>
         </p:nvCxnSpPr>
@@ -10460,7 +10408,7 @@
       </p:cxnSp>
       <p:cxnSp>
         <p:nvCxnSpPr>
-          <p:cNvPr id="112" name="Google Shape;112;p16"/>
+          <p:cNvPr id="111" name="Google Shape;111;p16"/>
           <p:cNvCxnSpPr/>
           <p:nvPr/>
         </p:nvCxnSpPr>
@@ -10486,7 +10434,7 @@
       </p:cxnSp>
       <p:cxnSp>
         <p:nvCxnSpPr>
-          <p:cNvPr id="113" name="Google Shape;113;p16"/>
+          <p:cNvPr id="112" name="Google Shape;112;p16"/>
           <p:cNvCxnSpPr/>
           <p:nvPr/>
         </p:nvCxnSpPr>
@@ -10523,7 +10471,7 @@
   <p:cSld>
     <p:spTree>
       <p:nvGrpSpPr>
-        <p:cNvPr id="117" name="Shape 117"/>
+        <p:cNvPr id="116" name="Shape 116"/>
         <p:cNvGrpSpPr/>
         <p:nvPr/>
       </p:nvGrpSpPr>
@@ -10537,7 +10485,7 @@
       </p:grpSpPr>
       <p:sp>
         <p:nvSpPr>
-          <p:cNvPr id="118" name="Google Shape;118;p17"/>
+          <p:cNvPr id="117" name="Google Shape;117;p17"/>
           <p:cNvSpPr txBox="1"/>
           <p:nvPr>
             <p:ph type="title"/>
@@ -10577,7 +10525,7 @@
       </p:sp>
       <p:sp>
         <p:nvSpPr>
-          <p:cNvPr id="119" name="Google Shape;119;p17"/>
+          <p:cNvPr id="118" name="Google Shape;118;p17"/>
           <p:cNvSpPr txBox="1"/>
           <p:nvPr>
             <p:ph idx="1" type="body"/>
@@ -10750,7 +10698,7 @@
   <p:cSld>
     <p:spTree>
       <p:nvGrpSpPr>
-        <p:cNvPr id="123" name="Shape 123"/>
+        <p:cNvPr id="122" name="Shape 122"/>
         <p:cNvGrpSpPr/>
         <p:nvPr/>
       </p:nvGrpSpPr>
@@ -10764,7 +10712,7 @@
       </p:grpSpPr>
       <p:sp>
         <p:nvSpPr>
-          <p:cNvPr id="124" name="Google Shape;124;p18"/>
+          <p:cNvPr id="123" name="Google Shape;123;p18"/>
           <p:cNvSpPr txBox="1"/>
           <p:nvPr>
             <p:ph type="title"/>
@@ -10804,7 +10752,7 @@
       </p:sp>
       <p:sp>
         <p:nvSpPr>
-          <p:cNvPr id="125" name="Google Shape;125;p18"/>
+          <p:cNvPr id="124" name="Google Shape;124;p18"/>
           <p:cNvSpPr txBox="1"/>
           <p:nvPr>
             <p:ph idx="1" type="body"/>
@@ -10990,7 +10938,7 @@
       </p:sp>
       <p:pic>
         <p:nvPicPr>
-          <p:cNvPr id="126" name="Google Shape;126;p18"/>
+          <p:cNvPr id="125" name="Google Shape;125;p18"/>
           <p:cNvPicPr preferRelativeResize="0"/>
           <p:nvPr/>
         </p:nvPicPr>
@@ -11029,7 +10977,7 @@
   <p:cSld>
     <p:spTree>
       <p:nvGrpSpPr>
-        <p:cNvPr id="130" name="Shape 130"/>
+        <p:cNvPr id="129" name="Shape 129"/>
         <p:cNvGrpSpPr/>
         <p:nvPr/>
       </p:nvGrpSpPr>
@@ -11043,7 +10991,7 @@
       </p:grpSpPr>
       <p:sp>
         <p:nvSpPr>
-          <p:cNvPr id="131" name="Google Shape;131;p19"/>
+          <p:cNvPr id="130" name="Google Shape;130;p19"/>
           <p:cNvSpPr txBox="1"/>
           <p:nvPr>
             <p:ph type="title"/>
@@ -11083,7 +11031,7 @@
       </p:sp>
       <p:sp>
         <p:nvSpPr>
-          <p:cNvPr id="132" name="Google Shape;132;p19"/>
+          <p:cNvPr id="131" name="Google Shape;131;p19"/>
           <p:cNvSpPr txBox="1"/>
           <p:nvPr>
             <p:ph idx="1" type="body"/>
@@ -11294,7 +11242,7 @@
       </p:sp>
       <p:pic>
         <p:nvPicPr>
-          <p:cNvPr id="133" name="Google Shape;133;p19"/>
+          <p:cNvPr id="132" name="Google Shape;132;p19"/>
           <p:cNvPicPr preferRelativeResize="0"/>
           <p:nvPr/>
         </p:nvPicPr>
@@ -11322,7 +11270,7 @@
       </p:pic>
       <p:pic>
         <p:nvPicPr>
-          <p:cNvPr id="134" name="Google Shape;134;p19"/>
+          <p:cNvPr id="133" name="Google Shape;133;p19"/>
           <p:cNvPicPr preferRelativeResize="0"/>
           <p:nvPr/>
         </p:nvPicPr>
@@ -11350,7 +11298,7 @@
       </p:pic>
       <p:pic>
         <p:nvPicPr>
-          <p:cNvPr id="135" name="Google Shape;135;p19"/>
+          <p:cNvPr id="134" name="Google Shape;134;p19"/>
           <p:cNvPicPr preferRelativeResize="0"/>
           <p:nvPr/>
         </p:nvPicPr>
@@ -11378,7 +11326,7 @@
       </p:pic>
       <p:pic>
         <p:nvPicPr>
-          <p:cNvPr id="136" name="Google Shape;136;p19"/>
+          <p:cNvPr id="135" name="Google Shape;135;p19"/>
           <p:cNvPicPr preferRelativeResize="0"/>
           <p:nvPr/>
         </p:nvPicPr>
@@ -11406,7 +11354,7 @@
       </p:pic>
       <p:sp>
         <p:nvSpPr>
-          <p:cNvPr id="137" name="Google Shape;137;p19"/>
+          <p:cNvPr id="136" name="Google Shape;136;p19"/>
           <p:cNvSpPr txBox="1"/>
           <p:nvPr/>
         </p:nvSpPr>
@@ -11464,7 +11412,7 @@
       </p:sp>
       <p:sp>
         <p:nvSpPr>
-          <p:cNvPr id="138" name="Google Shape;138;p19"/>
+          <p:cNvPr id="137" name="Google Shape;137;p19"/>
           <p:cNvSpPr txBox="1"/>
           <p:nvPr/>
         </p:nvSpPr>
@@ -11533,7 +11481,7 @@
   <p:cSld>
     <p:spTree>
       <p:nvGrpSpPr>
-        <p:cNvPr id="142" name="Shape 142"/>
+        <p:cNvPr id="141" name="Shape 141"/>
         <p:cNvGrpSpPr/>
         <p:nvPr/>
       </p:nvGrpSpPr>
@@ -11547,7 +11495,7 @@
       </p:grpSpPr>
       <p:sp>
         <p:nvSpPr>
-          <p:cNvPr id="143" name="Google Shape;143;p20"/>
+          <p:cNvPr id="142" name="Google Shape;142;p20"/>
           <p:cNvSpPr txBox="1"/>
           <p:nvPr>
             <p:ph type="title"/>
@@ -11602,7 +11550,7 @@
       </p:sp>
       <p:sp>
         <p:nvSpPr>
-          <p:cNvPr id="144" name="Google Shape;144;p20"/>
+          <p:cNvPr id="143" name="Google Shape;143;p20"/>
           <p:cNvSpPr txBox="1"/>
           <p:nvPr>
             <p:ph idx="1" type="body"/>
@@ -11783,7 +11731,7 @@
       </p:sp>
       <p:pic>
         <p:nvPicPr>
-          <p:cNvPr id="145" name="Google Shape;145;p20"/>
+          <p:cNvPr id="144" name="Google Shape;144;p20"/>
           <p:cNvPicPr preferRelativeResize="0"/>
           <p:nvPr/>
         </p:nvPicPr>
@@ -11811,7 +11759,7 @@
       </p:pic>
       <p:pic>
         <p:nvPicPr>
-          <p:cNvPr id="146" name="Google Shape;146;p20"/>
+          <p:cNvPr id="145" name="Google Shape;145;p20"/>
           <p:cNvPicPr preferRelativeResize="0"/>
           <p:nvPr/>
         </p:nvPicPr>
@@ -11850,7 +11798,7 @@
   <p:cSld>
     <p:spTree>
       <p:nvGrpSpPr>
-        <p:cNvPr id="150" name="Shape 150"/>
+        <p:cNvPr id="149" name="Shape 149"/>
         <p:cNvGrpSpPr/>
         <p:nvPr/>
       </p:nvGrpSpPr>
@@ -11864,7 +11812,7 @@
       </p:grpSpPr>
       <p:sp>
         <p:nvSpPr>
-          <p:cNvPr id="151" name="Google Shape;151;p21"/>
+          <p:cNvPr id="150" name="Google Shape;150;p21"/>
           <p:cNvSpPr txBox="1"/>
           <p:nvPr>
             <p:ph idx="1" type="body"/>
@@ -12055,7 +12003,11 @@
             </a:pPr>
             <a:r>
               <a:rPr lang="en" sz="1400"/>
-              <a:t>Facebook: ‘outlet’ and ‘domain’ were relaxed to 65% and 60% adherence</a:t>
+              <a:t>Facebook: ‘outlet’ and ‘domain’ were relaxed to 65% and 60% adherence, respect</a:t>
+            </a:r>
+            <a:r>
+              <a:rPr lang="en"/>
+              <a:t>ively</a:t>
             </a:r>
             <a:endParaRPr/>
           </a:p>
@@ -12083,7 +12035,7 @@
       </p:sp>
       <p:sp>
         <p:nvSpPr>
-          <p:cNvPr id="152" name="Google Shape;152;p21"/>
+          <p:cNvPr id="151" name="Google Shape;151;p21"/>
           <p:cNvSpPr txBox="1"/>
           <p:nvPr>
             <p:ph type="title"/>
@@ -12127,7 +12079,7 @@
       </p:sp>
       <p:pic>
         <p:nvPicPr>
-          <p:cNvPr id="153" name="Google Shape;153;p21"/>
+          <p:cNvPr id="152" name="Google Shape;152;p21"/>
           <p:cNvPicPr preferRelativeResize="0"/>
           <p:nvPr/>
         </p:nvPicPr>

</xml_diff>